<commit_message>
final changes for container lesson
</commit_message>
<xml_diff>
--- a/Misc Topics/Containers and Images/Containers and Images.pptx
+++ b/Misc Topics/Containers and Images/Containers and Images.pptx
@@ -5,7 +5,7 @@
     <p:sldMasterId id="2147483648" r:id="rId1"/>
   </p:sldMasterIdLst>
   <p:notesMasterIdLst>
-    <p:notesMasterId r:id="rId28"/>
+    <p:notesMasterId r:id="rId31"/>
   </p:notesMasterIdLst>
   <p:sldIdLst>
     <p:sldId id="256" r:id="rId2"/>
@@ -34,6 +34,9 @@
     <p:sldId id="392" r:id="rId25"/>
     <p:sldId id="364" r:id="rId26"/>
     <p:sldId id="365" r:id="rId27"/>
+    <p:sldId id="394" r:id="rId28"/>
+    <p:sldId id="395" r:id="rId29"/>
+    <p:sldId id="396" r:id="rId30"/>
   </p:sldIdLst>
   <p:sldSz cx="12192000" cy="6858000"/>
   <p:notesSz cx="6858000" cy="9144000"/>
@@ -222,7 +225,7 @@
           <a:p>
             <a:fld id="{7D2F5B96-EC90-4B10-91AC-E32DA21E81E1}" type="datetimeFigureOut">
               <a:rPr lang="en-US" smtClean="0"/>
-              <a:t>11/19/2025</a:t>
+              <a:t>11/20/2025</a:t>
             </a:fld>
             <a:endParaRPr lang="en-US"/>
           </a:p>
@@ -636,7 +639,7 @@
           <a:p>
             <a:fld id="{AD3160A9-B1E4-4AE8-B854-46ED2C2068C2}" type="datetimeFigureOut">
               <a:rPr lang="en-US" smtClean="0"/>
-              <a:t>11/19/2025</a:t>
+              <a:t>11/20/2025</a:t>
             </a:fld>
             <a:endParaRPr lang="en-US"/>
           </a:p>
@@ -834,7 +837,7 @@
           <a:p>
             <a:fld id="{AD3160A9-B1E4-4AE8-B854-46ED2C2068C2}" type="datetimeFigureOut">
               <a:rPr lang="en-US" smtClean="0"/>
-              <a:t>11/19/2025</a:t>
+              <a:t>11/20/2025</a:t>
             </a:fld>
             <a:endParaRPr lang="en-US"/>
           </a:p>
@@ -1042,7 +1045,7 @@
           <a:p>
             <a:fld id="{AD3160A9-B1E4-4AE8-B854-46ED2C2068C2}" type="datetimeFigureOut">
               <a:rPr lang="en-US" smtClean="0"/>
-              <a:t>11/19/2025</a:t>
+              <a:t>11/20/2025</a:t>
             </a:fld>
             <a:endParaRPr lang="en-US"/>
           </a:p>
@@ -1240,7 +1243,7 @@
           <a:p>
             <a:fld id="{AD3160A9-B1E4-4AE8-B854-46ED2C2068C2}" type="datetimeFigureOut">
               <a:rPr lang="en-US" smtClean="0"/>
-              <a:t>11/19/2025</a:t>
+              <a:t>11/20/2025</a:t>
             </a:fld>
             <a:endParaRPr lang="en-US"/>
           </a:p>
@@ -1515,7 +1518,7 @@
           <a:p>
             <a:fld id="{AD3160A9-B1E4-4AE8-B854-46ED2C2068C2}" type="datetimeFigureOut">
               <a:rPr lang="en-US" smtClean="0"/>
-              <a:t>11/19/2025</a:t>
+              <a:t>11/20/2025</a:t>
             </a:fld>
             <a:endParaRPr lang="en-US"/>
           </a:p>
@@ -1780,7 +1783,7 @@
           <a:p>
             <a:fld id="{AD3160A9-B1E4-4AE8-B854-46ED2C2068C2}" type="datetimeFigureOut">
               <a:rPr lang="en-US" smtClean="0"/>
-              <a:t>11/19/2025</a:t>
+              <a:t>11/20/2025</a:t>
             </a:fld>
             <a:endParaRPr lang="en-US"/>
           </a:p>
@@ -2192,7 +2195,7 @@
           <a:p>
             <a:fld id="{AD3160A9-B1E4-4AE8-B854-46ED2C2068C2}" type="datetimeFigureOut">
               <a:rPr lang="en-US" smtClean="0"/>
-              <a:t>11/19/2025</a:t>
+              <a:t>11/20/2025</a:t>
             </a:fld>
             <a:endParaRPr lang="en-US"/>
           </a:p>
@@ -2333,7 +2336,7 @@
           <a:p>
             <a:fld id="{AD3160A9-B1E4-4AE8-B854-46ED2C2068C2}" type="datetimeFigureOut">
               <a:rPr lang="en-US" smtClean="0"/>
-              <a:t>11/19/2025</a:t>
+              <a:t>11/20/2025</a:t>
             </a:fld>
             <a:endParaRPr lang="en-US"/>
           </a:p>
@@ -2446,7 +2449,7 @@
           <a:p>
             <a:fld id="{AD3160A9-B1E4-4AE8-B854-46ED2C2068C2}" type="datetimeFigureOut">
               <a:rPr lang="en-US" smtClean="0"/>
-              <a:t>11/19/2025</a:t>
+              <a:t>11/20/2025</a:t>
             </a:fld>
             <a:endParaRPr lang="en-US"/>
           </a:p>
@@ -2757,7 +2760,7 @@
           <a:p>
             <a:fld id="{AD3160A9-B1E4-4AE8-B854-46ED2C2068C2}" type="datetimeFigureOut">
               <a:rPr lang="en-US" smtClean="0"/>
-              <a:t>11/19/2025</a:t>
+              <a:t>11/20/2025</a:t>
             </a:fld>
             <a:endParaRPr lang="en-US"/>
           </a:p>
@@ -3045,7 +3048,7 @@
           <a:p>
             <a:fld id="{AD3160A9-B1E4-4AE8-B854-46ED2C2068C2}" type="datetimeFigureOut">
               <a:rPr lang="en-US" smtClean="0"/>
-              <a:t>11/19/2025</a:t>
+              <a:t>11/20/2025</a:t>
             </a:fld>
             <a:endParaRPr lang="en-US"/>
           </a:p>
@@ -3286,7 +3289,7 @@
           <a:p>
             <a:fld id="{AD3160A9-B1E4-4AE8-B854-46ED2C2068C2}" type="datetimeFigureOut">
               <a:rPr lang="en-US" smtClean="0"/>
-              <a:t>11/19/2025</a:t>
+              <a:t>11/20/2025</a:t>
             </a:fld>
             <a:endParaRPr lang="en-US"/>
           </a:p>
@@ -7410,6 +7413,810 @@
 </p:sld>
 </file>
 
+<file path=ppt/slides/slide27.xml><?xml version="1.0" encoding="utf-8"?>
+<p:sld xmlns:a="http://schemas.openxmlformats.org/drawingml/2006/main" xmlns:r="http://schemas.openxmlformats.org/officeDocument/2006/relationships" xmlns:p="http://schemas.openxmlformats.org/presentationml/2006/main">
+  <p:cSld>
+    <p:spTree>
+      <p:nvGrpSpPr>
+        <p:cNvPr id="1" name=""/>
+        <p:cNvGrpSpPr/>
+        <p:nvPr/>
+      </p:nvGrpSpPr>
+      <p:grpSpPr>
+        <a:xfrm>
+          <a:off x="0" y="0"/>
+          <a:ext cx="0" cy="0"/>
+          <a:chOff x="0" y="0"/>
+          <a:chExt cx="0" cy="0"/>
+        </a:xfrm>
+      </p:grpSpPr>
+      <p:sp>
+        <p:nvSpPr>
+          <p:cNvPr id="2" name="Title 1">
+            <a:extLst>
+              <a:ext uri="{FF2B5EF4-FFF2-40B4-BE49-F238E27FC236}">
+                <a16:creationId xmlns:a16="http://schemas.microsoft.com/office/drawing/2014/main" id="{3181A64B-9ABC-3000-628A-06CF1265C556}"/>
+              </a:ext>
+            </a:extLst>
+          </p:cNvPr>
+          <p:cNvSpPr>
+            <a:spLocks noGrp="1"/>
+          </p:cNvSpPr>
+          <p:nvPr>
+            <p:ph type="title"/>
+          </p:nvPr>
+        </p:nvSpPr>
+        <p:spPr/>
+        <p:txBody>
+          <a:bodyPr/>
+          <a:lstStyle/>
+          <a:p>
+            <a:r>
+              <a:rPr lang="en-US" dirty="0"/>
+              <a:t>Another Demo</a:t>
+            </a:r>
+          </a:p>
+        </p:txBody>
+      </p:sp>
+      <p:sp>
+        <p:nvSpPr>
+          <p:cNvPr id="3" name="Content Placeholder 2">
+            <a:extLst>
+              <a:ext uri="{FF2B5EF4-FFF2-40B4-BE49-F238E27FC236}">
+                <a16:creationId xmlns:a16="http://schemas.microsoft.com/office/drawing/2014/main" id="{61E1C52B-5033-8B7F-BFF2-508D10EF1F0B}"/>
+              </a:ext>
+            </a:extLst>
+          </p:cNvPr>
+          <p:cNvSpPr>
+            <a:spLocks noGrp="1"/>
+          </p:cNvSpPr>
+          <p:nvPr>
+            <p:ph sz="half" idx="1"/>
+          </p:nvPr>
+        </p:nvSpPr>
+        <p:spPr/>
+        <p:txBody>
+          <a:bodyPr/>
+          <a:lstStyle/>
+          <a:p>
+            <a:r>
+              <a:rPr lang="en-US" dirty="0"/>
+              <a:t>docker container run -it alpine</a:t>
+            </a:r>
+          </a:p>
+          <a:p>
+            <a:r>
+              <a:rPr lang="en-US" dirty="0"/>
+              <a:t>echo hello &gt; test.txt</a:t>
+            </a:r>
+          </a:p>
+          <a:p>
+            <a:r>
+              <a:rPr lang="en-US" dirty="0"/>
+              <a:t>cat test.txt</a:t>
+            </a:r>
+          </a:p>
+          <a:p>
+            <a:r>
+              <a:rPr lang="en-US" dirty="0"/>
+              <a:t>Use docker desktop to inspect filesystem</a:t>
+            </a:r>
+          </a:p>
+          <a:p>
+            <a:endParaRPr lang="en-US" dirty="0"/>
+          </a:p>
+        </p:txBody>
+      </p:sp>
+      <p:sp>
+        <p:nvSpPr>
+          <p:cNvPr id="4" name="Content Placeholder 3">
+            <a:extLst>
+              <a:ext uri="{FF2B5EF4-FFF2-40B4-BE49-F238E27FC236}">
+                <a16:creationId xmlns:a16="http://schemas.microsoft.com/office/drawing/2014/main" id="{BB5786F0-CE58-FF63-316C-69C41BC1C2B1}"/>
+              </a:ext>
+            </a:extLst>
+          </p:cNvPr>
+          <p:cNvSpPr>
+            <a:spLocks noGrp="1"/>
+          </p:cNvSpPr>
+          <p:nvPr>
+            <p:ph sz="half" idx="2"/>
+          </p:nvPr>
+        </p:nvSpPr>
+        <p:spPr/>
+        <p:txBody>
+          <a:bodyPr/>
+          <a:lstStyle/>
+          <a:p>
+            <a:endParaRPr lang="en-US"/>
+          </a:p>
+        </p:txBody>
+      </p:sp>
+      <p:sp>
+        <p:nvSpPr>
+          <p:cNvPr id="5" name="Footer Placeholder 4">
+            <a:extLst>
+              <a:ext uri="{FF2B5EF4-FFF2-40B4-BE49-F238E27FC236}">
+                <a16:creationId xmlns:a16="http://schemas.microsoft.com/office/drawing/2014/main" id="{5B9FAC41-9DED-93AD-F4A4-74C637581EC2}"/>
+              </a:ext>
+            </a:extLst>
+          </p:cNvPr>
+          <p:cNvSpPr>
+            <a:spLocks noGrp="1"/>
+          </p:cNvSpPr>
+          <p:nvPr>
+            <p:ph type="ftr" sz="quarter" idx="11"/>
+          </p:nvPr>
+        </p:nvSpPr>
+        <p:spPr/>
+        <p:txBody>
+          <a:bodyPr/>
+          <a:lstStyle/>
+          <a:p>
+            <a:endParaRPr lang="en-US"/>
+          </a:p>
+        </p:txBody>
+      </p:sp>
+      <p:sp>
+        <p:nvSpPr>
+          <p:cNvPr id="6" name="Slide Number Placeholder 5">
+            <a:extLst>
+              <a:ext uri="{FF2B5EF4-FFF2-40B4-BE49-F238E27FC236}">
+                <a16:creationId xmlns:a16="http://schemas.microsoft.com/office/drawing/2014/main" id="{872139EB-8E23-4F7B-F020-13312A40CFC9}"/>
+              </a:ext>
+            </a:extLst>
+          </p:cNvPr>
+          <p:cNvSpPr>
+            <a:spLocks noGrp="1"/>
+          </p:cNvSpPr>
+          <p:nvPr>
+            <p:ph type="sldNum" sz="quarter" idx="12"/>
+          </p:nvPr>
+        </p:nvSpPr>
+        <p:spPr/>
+        <p:txBody>
+          <a:bodyPr/>
+          <a:lstStyle/>
+          <a:p>
+            <a:fld id="{18039B46-FA54-4B70-AC0D-4BB93E2046DD}" type="slidenum">
+              <a:rPr lang="en-US" smtClean="0"/>
+              <a:t>27</a:t>
+            </a:fld>
+            <a:endParaRPr lang="en-US"/>
+          </a:p>
+        </p:txBody>
+      </p:sp>
+    </p:spTree>
+    <p:extLst>
+      <p:ext uri="{BB962C8B-B14F-4D97-AF65-F5344CB8AC3E}">
+        <p14:creationId xmlns:p14="http://schemas.microsoft.com/office/powerpoint/2010/main" val="1179256607"/>
+      </p:ext>
+    </p:extLst>
+  </p:cSld>
+  <p:clrMapOvr>
+    <a:masterClrMapping/>
+  </p:clrMapOvr>
+</p:sld>
+</file>
+
+<file path=ppt/slides/slide28.xml><?xml version="1.0" encoding="utf-8"?>
+<p:sld xmlns:a="http://schemas.openxmlformats.org/drawingml/2006/main" xmlns:r="http://schemas.openxmlformats.org/officeDocument/2006/relationships" xmlns:p="http://schemas.openxmlformats.org/presentationml/2006/main">
+  <p:cSld>
+    <p:spTree>
+      <p:nvGrpSpPr>
+        <p:cNvPr id="1" name=""/>
+        <p:cNvGrpSpPr/>
+        <p:nvPr/>
+      </p:nvGrpSpPr>
+      <p:grpSpPr>
+        <a:xfrm>
+          <a:off x="0" y="0"/>
+          <a:ext cx="0" cy="0"/>
+          <a:chOff x="0" y="0"/>
+          <a:chExt cx="0" cy="0"/>
+        </a:xfrm>
+      </p:grpSpPr>
+      <p:sp>
+        <p:nvSpPr>
+          <p:cNvPr id="6" name="Title 5">
+            <a:extLst>
+              <a:ext uri="{FF2B5EF4-FFF2-40B4-BE49-F238E27FC236}">
+                <a16:creationId xmlns:a16="http://schemas.microsoft.com/office/drawing/2014/main" id="{BD92EEC7-97E8-3C84-E478-FE95C1403415}"/>
+              </a:ext>
+            </a:extLst>
+          </p:cNvPr>
+          <p:cNvSpPr>
+            <a:spLocks noGrp="1"/>
+          </p:cNvSpPr>
+          <p:nvPr>
+            <p:ph type="title"/>
+          </p:nvPr>
+        </p:nvSpPr>
+        <p:spPr/>
+        <p:txBody>
+          <a:bodyPr/>
+          <a:lstStyle/>
+          <a:p>
+            <a:r>
+              <a:rPr lang="en-US" dirty="0"/>
+              <a:t>Container vs Image</a:t>
+            </a:r>
+          </a:p>
+        </p:txBody>
+      </p:sp>
+      <p:sp>
+        <p:nvSpPr>
+          <p:cNvPr id="7" name="Content Placeholder 6">
+            <a:extLst>
+              <a:ext uri="{FF2B5EF4-FFF2-40B4-BE49-F238E27FC236}">
+                <a16:creationId xmlns:a16="http://schemas.microsoft.com/office/drawing/2014/main" id="{9FB1E5C2-D011-16F5-56BC-7DB2635A7B01}"/>
+              </a:ext>
+            </a:extLst>
+          </p:cNvPr>
+          <p:cNvSpPr>
+            <a:spLocks noGrp="1"/>
+          </p:cNvSpPr>
+          <p:nvPr>
+            <p:ph idx="1"/>
+          </p:nvPr>
+        </p:nvSpPr>
+        <p:spPr/>
+        <p:txBody>
+          <a:bodyPr/>
+          <a:lstStyle/>
+          <a:p>
+            <a:r>
+              <a:rPr lang="en-US" dirty="0"/>
+              <a:t>Containers run from immutable images</a:t>
+            </a:r>
+          </a:p>
+          <a:p>
+            <a:r>
+              <a:rPr lang="en-US" dirty="0"/>
+              <a:t>So how are we writing a file???</a:t>
+            </a:r>
+          </a:p>
+          <a:p>
+            <a:r>
+              <a:rPr lang="en-US" dirty="0"/>
+              <a:t>Each container gets a R/W layer that is shimmed on top of the images</a:t>
+            </a:r>
+          </a:p>
+          <a:p>
+            <a:pPr lvl="1"/>
+            <a:r>
+              <a:rPr lang="en-US" dirty="0"/>
+              <a:t>R/W layer </a:t>
+            </a:r>
+            <a:r>
+              <a:rPr lang="en-US" i="1" dirty="0"/>
+              <a:t>saved</a:t>
+            </a:r>
+            <a:r>
+              <a:rPr lang="en-US" dirty="0"/>
+              <a:t> when container is </a:t>
+            </a:r>
+            <a:r>
+              <a:rPr lang="en-US" i="1" dirty="0"/>
+              <a:t>stopped</a:t>
+            </a:r>
+            <a:endParaRPr lang="en-US" dirty="0"/>
+          </a:p>
+          <a:p>
+            <a:pPr lvl="1"/>
+            <a:r>
+              <a:rPr lang="en-US" i="1" dirty="0"/>
+              <a:t>Deleted</a:t>
+            </a:r>
+            <a:r>
+              <a:rPr lang="en-US" dirty="0"/>
+              <a:t> when container is </a:t>
+            </a:r>
+            <a:r>
+              <a:rPr lang="en-US" i="1" dirty="0"/>
+              <a:t>removed</a:t>
+            </a:r>
+          </a:p>
+          <a:p>
+            <a:endParaRPr lang="en-US" dirty="0"/>
+          </a:p>
+        </p:txBody>
+      </p:sp>
+      <p:sp>
+        <p:nvSpPr>
+          <p:cNvPr id="4" name="Footer Placeholder 3">
+            <a:extLst>
+              <a:ext uri="{FF2B5EF4-FFF2-40B4-BE49-F238E27FC236}">
+                <a16:creationId xmlns:a16="http://schemas.microsoft.com/office/drawing/2014/main" id="{14CEBB94-5815-3ECA-4AEA-748D1A058A54}"/>
+              </a:ext>
+            </a:extLst>
+          </p:cNvPr>
+          <p:cNvSpPr>
+            <a:spLocks noGrp="1"/>
+          </p:cNvSpPr>
+          <p:nvPr>
+            <p:ph type="ftr" sz="quarter" idx="11"/>
+          </p:nvPr>
+        </p:nvSpPr>
+        <p:spPr/>
+        <p:txBody>
+          <a:bodyPr/>
+          <a:lstStyle/>
+          <a:p>
+            <a:endParaRPr lang="en-US" dirty="0"/>
+          </a:p>
+        </p:txBody>
+      </p:sp>
+      <p:sp>
+        <p:nvSpPr>
+          <p:cNvPr id="5" name="Slide Number Placeholder 4">
+            <a:extLst>
+              <a:ext uri="{FF2B5EF4-FFF2-40B4-BE49-F238E27FC236}">
+                <a16:creationId xmlns:a16="http://schemas.microsoft.com/office/drawing/2014/main" id="{1115069B-1B32-5AE3-1060-426423F73330}"/>
+              </a:ext>
+            </a:extLst>
+          </p:cNvPr>
+          <p:cNvSpPr>
+            <a:spLocks noGrp="1"/>
+          </p:cNvSpPr>
+          <p:nvPr>
+            <p:ph type="sldNum" sz="quarter" idx="12"/>
+          </p:nvPr>
+        </p:nvSpPr>
+        <p:spPr/>
+        <p:txBody>
+          <a:bodyPr/>
+          <a:lstStyle/>
+          <a:p>
+            <a:fld id="{18039B46-FA54-4B70-AC0D-4BB93E2046DD}" type="slidenum">
+              <a:rPr lang="en-US" smtClean="0"/>
+              <a:t>28</a:t>
+            </a:fld>
+            <a:endParaRPr lang="en-US"/>
+          </a:p>
+        </p:txBody>
+      </p:sp>
+    </p:spTree>
+    <p:extLst>
+      <p:ext uri="{BB962C8B-B14F-4D97-AF65-F5344CB8AC3E}">
+        <p14:creationId xmlns:p14="http://schemas.microsoft.com/office/powerpoint/2010/main" val="3523810633"/>
+      </p:ext>
+    </p:extLst>
+  </p:cSld>
+  <p:clrMapOvr>
+    <a:masterClrMapping/>
+  </p:clrMapOvr>
+  <p:timing>
+    <p:tnLst>
+      <p:par>
+        <p:cTn id="1" dur="indefinite" restart="never" nodeType="tmRoot">
+          <p:childTnLst>
+            <p:seq concurrent="1" nextAc="seek">
+              <p:cTn id="2" dur="indefinite" nodeType="mainSeq">
+                <p:childTnLst>
+                  <p:par>
+                    <p:cTn id="3" fill="hold">
+                      <p:stCondLst>
+                        <p:cond delay="indefinite"/>
+                      </p:stCondLst>
+                      <p:childTnLst>
+                        <p:par>
+                          <p:cTn id="4" fill="hold">
+                            <p:stCondLst>
+                              <p:cond delay="0"/>
+                            </p:stCondLst>
+                            <p:childTnLst>
+                              <p:par>
+                                <p:cTn id="5" presetID="1" presetClass="entr" presetSubtype="0" fill="hold" grpId="0" nodeType="clickEffect">
+                                  <p:stCondLst>
+                                    <p:cond delay="0"/>
+                                  </p:stCondLst>
+                                  <p:childTnLst>
+                                    <p:set>
+                                      <p:cBhvr>
+                                        <p:cTn id="6" dur="1" fill="hold">
+                                          <p:stCondLst>
+                                            <p:cond delay="0"/>
+                                          </p:stCondLst>
+                                        </p:cTn>
+                                        <p:tgtEl>
+                                          <p:spTgt spid="7">
+                                            <p:txEl>
+                                              <p:pRg st="0" end="0"/>
+                                            </p:txEl>
+                                          </p:spTgt>
+                                        </p:tgtEl>
+                                        <p:attrNameLst>
+                                          <p:attrName>style.visibility</p:attrName>
+                                        </p:attrNameLst>
+                                      </p:cBhvr>
+                                      <p:to>
+                                        <p:strVal val="visible"/>
+                                      </p:to>
+                                    </p:set>
+                                  </p:childTnLst>
+                                </p:cTn>
+                              </p:par>
+                            </p:childTnLst>
+                          </p:cTn>
+                        </p:par>
+                      </p:childTnLst>
+                    </p:cTn>
+                  </p:par>
+                  <p:par>
+                    <p:cTn id="7" fill="hold">
+                      <p:stCondLst>
+                        <p:cond delay="indefinite"/>
+                      </p:stCondLst>
+                      <p:childTnLst>
+                        <p:par>
+                          <p:cTn id="8" fill="hold">
+                            <p:stCondLst>
+                              <p:cond delay="0"/>
+                            </p:stCondLst>
+                            <p:childTnLst>
+                              <p:par>
+                                <p:cTn id="9" presetID="1" presetClass="entr" presetSubtype="0" fill="hold" grpId="0" nodeType="clickEffect">
+                                  <p:stCondLst>
+                                    <p:cond delay="0"/>
+                                  </p:stCondLst>
+                                  <p:childTnLst>
+                                    <p:set>
+                                      <p:cBhvr>
+                                        <p:cTn id="10" dur="1" fill="hold">
+                                          <p:stCondLst>
+                                            <p:cond delay="0"/>
+                                          </p:stCondLst>
+                                        </p:cTn>
+                                        <p:tgtEl>
+                                          <p:spTgt spid="7">
+                                            <p:txEl>
+                                              <p:pRg st="1" end="1"/>
+                                            </p:txEl>
+                                          </p:spTgt>
+                                        </p:tgtEl>
+                                        <p:attrNameLst>
+                                          <p:attrName>style.visibility</p:attrName>
+                                        </p:attrNameLst>
+                                      </p:cBhvr>
+                                      <p:to>
+                                        <p:strVal val="visible"/>
+                                      </p:to>
+                                    </p:set>
+                                  </p:childTnLst>
+                                </p:cTn>
+                              </p:par>
+                            </p:childTnLst>
+                          </p:cTn>
+                        </p:par>
+                      </p:childTnLst>
+                    </p:cTn>
+                  </p:par>
+                  <p:par>
+                    <p:cTn id="11" fill="hold">
+                      <p:stCondLst>
+                        <p:cond delay="indefinite"/>
+                      </p:stCondLst>
+                      <p:childTnLst>
+                        <p:par>
+                          <p:cTn id="12" fill="hold">
+                            <p:stCondLst>
+                              <p:cond delay="0"/>
+                            </p:stCondLst>
+                            <p:childTnLst>
+                              <p:par>
+                                <p:cTn id="13" presetID="1" presetClass="entr" presetSubtype="0" fill="hold" grpId="0" nodeType="clickEffect">
+                                  <p:stCondLst>
+                                    <p:cond delay="0"/>
+                                  </p:stCondLst>
+                                  <p:childTnLst>
+                                    <p:set>
+                                      <p:cBhvr>
+                                        <p:cTn id="14" dur="1" fill="hold">
+                                          <p:stCondLst>
+                                            <p:cond delay="0"/>
+                                          </p:stCondLst>
+                                        </p:cTn>
+                                        <p:tgtEl>
+                                          <p:spTgt spid="7">
+                                            <p:txEl>
+                                              <p:pRg st="2" end="2"/>
+                                            </p:txEl>
+                                          </p:spTgt>
+                                        </p:tgtEl>
+                                        <p:attrNameLst>
+                                          <p:attrName>style.visibility</p:attrName>
+                                        </p:attrNameLst>
+                                      </p:cBhvr>
+                                      <p:to>
+                                        <p:strVal val="visible"/>
+                                      </p:to>
+                                    </p:set>
+                                  </p:childTnLst>
+                                </p:cTn>
+                              </p:par>
+                              <p:par>
+                                <p:cTn id="15" presetID="1" presetClass="entr" presetSubtype="0" fill="hold" grpId="0" nodeType="withEffect">
+                                  <p:stCondLst>
+                                    <p:cond delay="0"/>
+                                  </p:stCondLst>
+                                  <p:childTnLst>
+                                    <p:set>
+                                      <p:cBhvr>
+                                        <p:cTn id="16" dur="1" fill="hold">
+                                          <p:stCondLst>
+                                            <p:cond delay="0"/>
+                                          </p:stCondLst>
+                                        </p:cTn>
+                                        <p:tgtEl>
+                                          <p:spTgt spid="7">
+                                            <p:txEl>
+                                              <p:pRg st="3" end="3"/>
+                                            </p:txEl>
+                                          </p:spTgt>
+                                        </p:tgtEl>
+                                        <p:attrNameLst>
+                                          <p:attrName>style.visibility</p:attrName>
+                                        </p:attrNameLst>
+                                      </p:cBhvr>
+                                      <p:to>
+                                        <p:strVal val="visible"/>
+                                      </p:to>
+                                    </p:set>
+                                  </p:childTnLst>
+                                </p:cTn>
+                              </p:par>
+                              <p:par>
+                                <p:cTn id="17" presetID="1" presetClass="entr" presetSubtype="0" fill="hold" grpId="0" nodeType="withEffect">
+                                  <p:stCondLst>
+                                    <p:cond delay="0"/>
+                                  </p:stCondLst>
+                                  <p:childTnLst>
+                                    <p:set>
+                                      <p:cBhvr>
+                                        <p:cTn id="18" dur="1" fill="hold">
+                                          <p:stCondLst>
+                                            <p:cond delay="0"/>
+                                          </p:stCondLst>
+                                        </p:cTn>
+                                        <p:tgtEl>
+                                          <p:spTgt spid="7">
+                                            <p:txEl>
+                                              <p:pRg st="4" end="4"/>
+                                            </p:txEl>
+                                          </p:spTgt>
+                                        </p:tgtEl>
+                                        <p:attrNameLst>
+                                          <p:attrName>style.visibility</p:attrName>
+                                        </p:attrNameLst>
+                                      </p:cBhvr>
+                                      <p:to>
+                                        <p:strVal val="visible"/>
+                                      </p:to>
+                                    </p:set>
+                                  </p:childTnLst>
+                                </p:cTn>
+                              </p:par>
+                            </p:childTnLst>
+                          </p:cTn>
+                        </p:par>
+                      </p:childTnLst>
+                    </p:cTn>
+                  </p:par>
+                </p:childTnLst>
+              </p:cTn>
+              <p:prevCondLst>
+                <p:cond evt="onPrev" delay="0">
+                  <p:tgtEl>
+                    <p:sldTgt/>
+                  </p:tgtEl>
+                </p:cond>
+              </p:prevCondLst>
+              <p:nextCondLst>
+                <p:cond evt="onNext" delay="0">
+                  <p:tgtEl>
+                    <p:sldTgt/>
+                  </p:tgtEl>
+                </p:cond>
+              </p:nextCondLst>
+            </p:seq>
+          </p:childTnLst>
+        </p:cTn>
+      </p:par>
+    </p:tnLst>
+    <p:bldLst>
+      <p:bldP spid="7" grpId="0" build="p"/>
+    </p:bldLst>
+  </p:timing>
+</p:sld>
+</file>
+
+<file path=ppt/slides/slide29.xml><?xml version="1.0" encoding="utf-8"?>
+<p:sld xmlns:a="http://schemas.openxmlformats.org/drawingml/2006/main" xmlns:r="http://schemas.openxmlformats.org/officeDocument/2006/relationships" xmlns:p="http://schemas.openxmlformats.org/presentationml/2006/main">
+  <p:cSld>
+    <p:spTree>
+      <p:nvGrpSpPr>
+        <p:cNvPr id="1" name=""/>
+        <p:cNvGrpSpPr/>
+        <p:nvPr/>
+      </p:nvGrpSpPr>
+      <p:grpSpPr>
+        <a:xfrm>
+          <a:off x="0" y="0"/>
+          <a:ext cx="0" cy="0"/>
+          <a:chOff x="0" y="0"/>
+          <a:chExt cx="0" cy="0"/>
+        </a:xfrm>
+      </p:grpSpPr>
+      <p:sp>
+        <p:nvSpPr>
+          <p:cNvPr id="2" name="Title 1">
+            <a:extLst>
+              <a:ext uri="{FF2B5EF4-FFF2-40B4-BE49-F238E27FC236}">
+                <a16:creationId xmlns:a16="http://schemas.microsoft.com/office/drawing/2014/main" id="{D285A893-9DAA-3F4C-FC1F-A7A7E4E19571}"/>
+              </a:ext>
+            </a:extLst>
+          </p:cNvPr>
+          <p:cNvSpPr>
+            <a:spLocks noGrp="1"/>
+          </p:cNvSpPr>
+          <p:nvPr>
+            <p:ph type="title"/>
+          </p:nvPr>
+        </p:nvSpPr>
+        <p:spPr/>
+        <p:txBody>
+          <a:bodyPr/>
+          <a:lstStyle/>
+          <a:p>
+            <a:r>
+              <a:rPr lang="en-US" dirty="0"/>
+              <a:t>Container Principles</a:t>
+            </a:r>
+          </a:p>
+        </p:txBody>
+      </p:sp>
+      <p:sp>
+        <p:nvSpPr>
+          <p:cNvPr id="3" name="Content Placeholder 2">
+            <a:extLst>
+              <a:ext uri="{FF2B5EF4-FFF2-40B4-BE49-F238E27FC236}">
+                <a16:creationId xmlns:a16="http://schemas.microsoft.com/office/drawing/2014/main" id="{C5E57029-C41A-124A-EF02-DC1E9073C2F6}"/>
+              </a:ext>
+            </a:extLst>
+          </p:cNvPr>
+          <p:cNvSpPr>
+            <a:spLocks noGrp="1"/>
+          </p:cNvSpPr>
+          <p:nvPr>
+            <p:ph idx="1"/>
+          </p:nvPr>
+        </p:nvSpPr>
+        <p:spPr/>
+        <p:txBody>
+          <a:bodyPr/>
+          <a:lstStyle/>
+          <a:p>
+            <a:r>
+              <a:rPr lang="en-US" dirty="0"/>
+              <a:t>Designed to be short-lived and ephemeral</a:t>
+            </a:r>
+          </a:p>
+          <a:p>
+            <a:pPr lvl="1"/>
+            <a:r>
+              <a:rPr lang="en-US" dirty="0"/>
+              <a:t>Stop once their “entry point” finishes</a:t>
+            </a:r>
+          </a:p>
+          <a:p>
+            <a:pPr lvl="1"/>
+            <a:r>
+              <a:rPr lang="en-US" dirty="0"/>
+              <a:t>Spin them up / tear them down as needed</a:t>
+            </a:r>
+          </a:p>
+          <a:p>
+            <a:r>
+              <a:rPr lang="en-US" dirty="0"/>
+              <a:t>Run command always starts a </a:t>
+            </a:r>
+            <a:r>
+              <a:rPr lang="en-US" i="1" dirty="0"/>
+              <a:t>new </a:t>
+            </a:r>
+            <a:r>
+              <a:rPr lang="en-US" dirty="0"/>
+              <a:t>container</a:t>
+            </a:r>
+          </a:p>
+          <a:p>
+            <a:r>
+              <a:rPr lang="en-US" dirty="0"/>
+              <a:t>Start/stop work with </a:t>
+            </a:r>
+            <a:r>
+              <a:rPr lang="en-US" i="1" dirty="0"/>
+              <a:t>existing </a:t>
+            </a:r>
+            <a:r>
+              <a:rPr lang="en-US" dirty="0"/>
+              <a:t>containers</a:t>
+            </a:r>
+          </a:p>
+          <a:p>
+            <a:pPr lvl="1"/>
+            <a:endParaRPr lang="en-US" dirty="0"/>
+          </a:p>
+        </p:txBody>
+      </p:sp>
+      <p:sp>
+        <p:nvSpPr>
+          <p:cNvPr id="4" name="Footer Placeholder 3">
+            <a:extLst>
+              <a:ext uri="{FF2B5EF4-FFF2-40B4-BE49-F238E27FC236}">
+                <a16:creationId xmlns:a16="http://schemas.microsoft.com/office/drawing/2014/main" id="{A2C76D8E-D07E-B2E1-2955-3AE9195D455E}"/>
+              </a:ext>
+            </a:extLst>
+          </p:cNvPr>
+          <p:cNvSpPr>
+            <a:spLocks noGrp="1"/>
+          </p:cNvSpPr>
+          <p:nvPr>
+            <p:ph type="ftr" sz="quarter" idx="11"/>
+          </p:nvPr>
+        </p:nvSpPr>
+        <p:spPr/>
+        <p:txBody>
+          <a:bodyPr/>
+          <a:lstStyle/>
+          <a:p>
+            <a:endParaRPr lang="en-US"/>
+          </a:p>
+        </p:txBody>
+      </p:sp>
+      <p:sp>
+        <p:nvSpPr>
+          <p:cNvPr id="5" name="Slide Number Placeholder 4">
+            <a:extLst>
+              <a:ext uri="{FF2B5EF4-FFF2-40B4-BE49-F238E27FC236}">
+                <a16:creationId xmlns:a16="http://schemas.microsoft.com/office/drawing/2014/main" id="{E66F4EC2-D255-3B53-CBD9-8D8F4D817D3E}"/>
+              </a:ext>
+            </a:extLst>
+          </p:cNvPr>
+          <p:cNvSpPr>
+            <a:spLocks noGrp="1"/>
+          </p:cNvSpPr>
+          <p:nvPr>
+            <p:ph type="sldNum" sz="quarter" idx="12"/>
+          </p:nvPr>
+        </p:nvSpPr>
+        <p:spPr/>
+        <p:txBody>
+          <a:bodyPr/>
+          <a:lstStyle/>
+          <a:p>
+            <a:fld id="{18039B46-FA54-4B70-AC0D-4BB93E2046DD}" type="slidenum">
+              <a:rPr lang="en-US" smtClean="0"/>
+              <a:t>29</a:t>
+            </a:fld>
+            <a:endParaRPr lang="en-US"/>
+          </a:p>
+        </p:txBody>
+      </p:sp>
+    </p:spTree>
+    <p:extLst>
+      <p:ext uri="{BB962C8B-B14F-4D97-AF65-F5344CB8AC3E}">
+        <p14:creationId xmlns:p14="http://schemas.microsoft.com/office/powerpoint/2010/main" val="2799958272"/>
+      </p:ext>
+    </p:extLst>
+  </p:cSld>
+  <p:clrMapOvr>
+    <a:masterClrMapping/>
+  </p:clrMapOvr>
+</p:sld>
+</file>
+
 <file path=ppt/slides/slide3.xml><?xml version="1.0" encoding="utf-8"?>
 <p:sld xmlns:a="http://schemas.openxmlformats.org/drawingml/2006/main" xmlns:r="http://schemas.openxmlformats.org/officeDocument/2006/relationships" xmlns:p="http://schemas.openxmlformats.org/presentationml/2006/main">
   <p:cSld>
@@ -7651,8 +8458,8 @@
         </p:blipFill>
         <p:spPr>
           <a:xfrm>
-            <a:off x="1330217" y="3083672"/>
-            <a:ext cx="4197566" cy="1835244"/>
+            <a:off x="132136" y="1202445"/>
+            <a:ext cx="6972050" cy="3048294"/>
           </a:xfrm>
         </p:spPr>
       </p:pic>
@@ -7680,8 +8487,8 @@
         </p:blipFill>
         <p:spPr>
           <a:xfrm>
-            <a:off x="6686443" y="3074146"/>
-            <a:ext cx="4153113" cy="1854295"/>
+            <a:off x="5216769" y="3569772"/>
+            <a:ext cx="6843096" cy="3055327"/>
           </a:xfrm>
         </p:spPr>
       </p:pic>

</xml_diff>